<commit_message>
Novas imagens do relatório
</commit_message>
<xml_diff>
--- a/Imagens/imagens_ppt.pptx
+++ b/Imagens/imagens_ppt.pptx
@@ -7,6 +7,8 @@
   <p:sldIdLst>
     <p:sldId id="256" r:id="rId2"/>
     <p:sldId id="257" r:id="rId3"/>
+    <p:sldId id="258" r:id="rId4"/>
+    <p:sldId id="259" r:id="rId5"/>
   </p:sldIdLst>
   <p:sldSz cx="12192000" cy="6858000"/>
   <p:notesSz cx="6858000" cy="9144000"/>
@@ -105,6 +107,11 @@
       </a:defRPr>
     </a:lvl9pPr>
   </p:defaultTextStyle>
+  <p:extLst>
+    <p:ext uri="{EFAFB233-063F-42B5-8137-9DF3F51BA10A}">
+      <p15:sldGuideLst xmlns:p15="http://schemas.microsoft.com/office/powerpoint/2012/main"/>
+    </p:ext>
+  </p:extLst>
 </p:presentation>
 </file>
 
@@ -255,7 +262,7 @@
           <a:p>
             <a:fld id="{58747F50-A787-42AD-BD4D-DDC713A9E983}" type="datetimeFigureOut">
               <a:rPr lang="pt-BR" smtClean="0"/>
-              <a:t>02/03/2021</a:t>
+              <a:t>19/03/2021</a:t>
             </a:fld>
             <a:endParaRPr lang="pt-BR"/>
           </a:p>
@@ -453,7 +460,7 @@
           <a:p>
             <a:fld id="{58747F50-A787-42AD-BD4D-DDC713A9E983}" type="datetimeFigureOut">
               <a:rPr lang="pt-BR" smtClean="0"/>
-              <a:t>02/03/2021</a:t>
+              <a:t>19/03/2021</a:t>
             </a:fld>
             <a:endParaRPr lang="pt-BR"/>
           </a:p>
@@ -661,7 +668,7 @@
           <a:p>
             <a:fld id="{58747F50-A787-42AD-BD4D-DDC713A9E983}" type="datetimeFigureOut">
               <a:rPr lang="pt-BR" smtClean="0"/>
-              <a:t>02/03/2021</a:t>
+              <a:t>19/03/2021</a:t>
             </a:fld>
             <a:endParaRPr lang="pt-BR"/>
           </a:p>
@@ -859,7 +866,7 @@
           <a:p>
             <a:fld id="{58747F50-A787-42AD-BD4D-DDC713A9E983}" type="datetimeFigureOut">
               <a:rPr lang="pt-BR" smtClean="0"/>
-              <a:t>02/03/2021</a:t>
+              <a:t>19/03/2021</a:t>
             </a:fld>
             <a:endParaRPr lang="pt-BR"/>
           </a:p>
@@ -1134,7 +1141,7 @@
           <a:p>
             <a:fld id="{58747F50-A787-42AD-BD4D-DDC713A9E983}" type="datetimeFigureOut">
               <a:rPr lang="pt-BR" smtClean="0"/>
-              <a:t>02/03/2021</a:t>
+              <a:t>19/03/2021</a:t>
             </a:fld>
             <a:endParaRPr lang="pt-BR"/>
           </a:p>
@@ -1399,7 +1406,7 @@
           <a:p>
             <a:fld id="{58747F50-A787-42AD-BD4D-DDC713A9E983}" type="datetimeFigureOut">
               <a:rPr lang="pt-BR" smtClean="0"/>
-              <a:t>02/03/2021</a:t>
+              <a:t>19/03/2021</a:t>
             </a:fld>
             <a:endParaRPr lang="pt-BR"/>
           </a:p>
@@ -1811,7 +1818,7 @@
           <a:p>
             <a:fld id="{58747F50-A787-42AD-BD4D-DDC713A9E983}" type="datetimeFigureOut">
               <a:rPr lang="pt-BR" smtClean="0"/>
-              <a:t>02/03/2021</a:t>
+              <a:t>19/03/2021</a:t>
             </a:fld>
             <a:endParaRPr lang="pt-BR"/>
           </a:p>
@@ -1952,7 +1959,7 @@
           <a:p>
             <a:fld id="{58747F50-A787-42AD-BD4D-DDC713A9E983}" type="datetimeFigureOut">
               <a:rPr lang="pt-BR" smtClean="0"/>
-              <a:t>02/03/2021</a:t>
+              <a:t>19/03/2021</a:t>
             </a:fld>
             <a:endParaRPr lang="pt-BR"/>
           </a:p>
@@ -2065,7 +2072,7 @@
           <a:p>
             <a:fld id="{58747F50-A787-42AD-BD4D-DDC713A9E983}" type="datetimeFigureOut">
               <a:rPr lang="pt-BR" smtClean="0"/>
-              <a:t>02/03/2021</a:t>
+              <a:t>19/03/2021</a:t>
             </a:fld>
             <a:endParaRPr lang="pt-BR"/>
           </a:p>
@@ -2376,7 +2383,7 @@
           <a:p>
             <a:fld id="{58747F50-A787-42AD-BD4D-DDC713A9E983}" type="datetimeFigureOut">
               <a:rPr lang="pt-BR" smtClean="0"/>
-              <a:t>02/03/2021</a:t>
+              <a:t>19/03/2021</a:t>
             </a:fld>
             <a:endParaRPr lang="pt-BR"/>
           </a:p>
@@ -2664,7 +2671,7 @@
           <a:p>
             <a:fld id="{58747F50-A787-42AD-BD4D-DDC713A9E983}" type="datetimeFigureOut">
               <a:rPr lang="pt-BR" smtClean="0"/>
-              <a:t>02/03/2021</a:t>
+              <a:t>19/03/2021</a:t>
             </a:fld>
             <a:endParaRPr lang="pt-BR"/>
           </a:p>
@@ -2905,7 +2912,7 @@
           <a:p>
             <a:fld id="{58747F50-A787-42AD-BD4D-DDC713A9E983}" type="datetimeFigureOut">
               <a:rPr lang="pt-BR" smtClean="0"/>
-              <a:t>02/03/2021</a:t>
+              <a:t>19/03/2021</a:t>
             </a:fld>
             <a:endParaRPr lang="pt-BR"/>
           </a:p>
@@ -3660,6 +3667,514 @@
 </p:sld>
 </file>
 
+<file path=ppt/slides/slide3.xml><?xml version="1.0" encoding="utf-8"?>
+<p:sld xmlns:a="http://schemas.openxmlformats.org/drawingml/2006/main" xmlns:r="http://schemas.openxmlformats.org/officeDocument/2006/relationships" xmlns:p="http://schemas.openxmlformats.org/presentationml/2006/main">
+  <p:cSld>
+    <p:spTree>
+      <p:nvGrpSpPr>
+        <p:cNvPr id="1" name=""/>
+        <p:cNvGrpSpPr/>
+        <p:nvPr/>
+      </p:nvGrpSpPr>
+      <p:grpSpPr>
+        <a:xfrm>
+          <a:off x="0" y="0"/>
+          <a:ext cx="0" cy="0"/>
+          <a:chOff x="0" y="0"/>
+          <a:chExt cx="0" cy="0"/>
+        </a:xfrm>
+      </p:grpSpPr>
+      <p:grpSp>
+        <p:nvGrpSpPr>
+          <p:cNvPr id="17" name="Agrupar 16">
+            <a:extLst>
+              <a:ext uri="{FF2B5EF4-FFF2-40B4-BE49-F238E27FC236}">
+                <a16:creationId xmlns:a16="http://schemas.microsoft.com/office/drawing/2014/main" id="{78C76571-8BBC-43A8-B9C9-7FE3087F10AA}"/>
+              </a:ext>
+            </a:extLst>
+          </p:cNvPr>
+          <p:cNvGrpSpPr/>
+          <p:nvPr/>
+        </p:nvGrpSpPr>
+        <p:grpSpPr>
+          <a:xfrm>
+            <a:off x="3721395" y="733647"/>
+            <a:ext cx="4603898" cy="4104167"/>
+            <a:chOff x="3721395" y="733647"/>
+            <a:chExt cx="4603898" cy="4104167"/>
+          </a:xfrm>
+        </p:grpSpPr>
+        <p:sp>
+          <p:nvSpPr>
+            <p:cNvPr id="16" name="Retângulo 15">
+              <a:extLst>
+                <a:ext uri="{FF2B5EF4-FFF2-40B4-BE49-F238E27FC236}">
+                  <a16:creationId xmlns:a16="http://schemas.microsoft.com/office/drawing/2014/main" id="{D90BD554-C042-4427-AA51-97628F624D62}"/>
+                </a:ext>
+              </a:extLst>
+            </p:cNvPr>
+            <p:cNvSpPr/>
+            <p:nvPr/>
+          </p:nvSpPr>
+          <p:spPr>
+            <a:xfrm>
+              <a:off x="3721395" y="733647"/>
+              <a:ext cx="4603898" cy="4104167"/>
+            </a:xfrm>
+            <a:prstGeom prst="rect">
+              <a:avLst/>
+            </a:prstGeom>
+            <a:solidFill>
+              <a:schemeClr val="bg1"/>
+            </a:solidFill>
+            <a:ln>
+              <a:noFill/>
+            </a:ln>
+          </p:spPr>
+          <p:style>
+            <a:lnRef idx="2">
+              <a:schemeClr val="accent1">
+                <a:shade val="50000"/>
+              </a:schemeClr>
+            </a:lnRef>
+            <a:fillRef idx="1">
+              <a:schemeClr val="accent1"/>
+            </a:fillRef>
+            <a:effectRef idx="0">
+              <a:schemeClr val="accent1"/>
+            </a:effectRef>
+            <a:fontRef idx="minor">
+              <a:schemeClr val="lt1"/>
+            </a:fontRef>
+          </p:style>
+          <p:txBody>
+            <a:bodyPr rtlCol="0" anchor="ctr"/>
+            <a:lstStyle/>
+            <a:p>
+              <a:pPr algn="ctr"/>
+              <a:endParaRPr lang="pt-BR"/>
+            </a:p>
+          </p:txBody>
+        </p:sp>
+        <p:grpSp>
+          <p:nvGrpSpPr>
+            <p:cNvPr id="15" name="Agrupar 14">
+              <a:extLst>
+                <a:ext uri="{FF2B5EF4-FFF2-40B4-BE49-F238E27FC236}">
+                  <a16:creationId xmlns:a16="http://schemas.microsoft.com/office/drawing/2014/main" id="{D30E70E3-50E9-42A7-B5F8-466A9FDA8CB9}"/>
+                </a:ext>
+              </a:extLst>
+            </p:cNvPr>
+            <p:cNvGrpSpPr/>
+            <p:nvPr/>
+          </p:nvGrpSpPr>
+          <p:grpSpPr>
+            <a:xfrm>
+              <a:off x="3834484" y="825877"/>
+              <a:ext cx="3601627" cy="3908762"/>
+              <a:chOff x="3834484" y="825877"/>
+              <a:chExt cx="3601627" cy="3908762"/>
+            </a:xfrm>
+          </p:grpSpPr>
+          <p:sp>
+            <p:nvSpPr>
+              <p:cNvPr id="4" name="Retângulo 3">
+                <a:extLst>
+                  <a:ext uri="{FF2B5EF4-FFF2-40B4-BE49-F238E27FC236}">
+                    <a16:creationId xmlns:a16="http://schemas.microsoft.com/office/drawing/2014/main" id="{8875D97D-43A7-455A-85CC-2D49A3DC587B}"/>
+                  </a:ext>
+                </a:extLst>
+              </p:cNvPr>
+              <p:cNvSpPr/>
+              <p:nvPr/>
+            </p:nvSpPr>
+            <p:spPr>
+              <a:xfrm>
+                <a:off x="4731488" y="1722474"/>
+                <a:ext cx="2668772" cy="2583712"/>
+              </a:xfrm>
+              <a:prstGeom prst="rect">
+                <a:avLst/>
+              </a:prstGeom>
+              <a:noFill/>
+              <a:ln>
+                <a:solidFill>
+                  <a:schemeClr val="tx1"/>
+                </a:solidFill>
+              </a:ln>
+            </p:spPr>
+            <p:style>
+              <a:lnRef idx="2">
+                <a:schemeClr val="accent1">
+                  <a:shade val="50000"/>
+                </a:schemeClr>
+              </a:lnRef>
+              <a:fillRef idx="1">
+                <a:schemeClr val="accent1"/>
+              </a:fillRef>
+              <a:effectRef idx="0">
+                <a:schemeClr val="accent1"/>
+              </a:effectRef>
+              <a:fontRef idx="minor">
+                <a:schemeClr val="lt1"/>
+              </a:fontRef>
+            </p:style>
+            <p:txBody>
+              <a:bodyPr rtlCol="0" anchor="ctr"/>
+              <a:lstStyle/>
+              <a:p>
+                <a:pPr algn="ctr"/>
+                <a:endParaRPr lang="pt-BR"/>
+              </a:p>
+            </p:txBody>
+          </p:sp>
+          <p:sp>
+            <p:nvSpPr>
+              <p:cNvPr id="10" name="Chave Esquerda 9">
+                <a:extLst>
+                  <a:ext uri="{FF2B5EF4-FFF2-40B4-BE49-F238E27FC236}">
+                    <a16:creationId xmlns:a16="http://schemas.microsoft.com/office/drawing/2014/main" id="{8459CBFA-F9FC-4410-85FA-1F9176381D66}"/>
+                  </a:ext>
+                </a:extLst>
+              </p:cNvPr>
+              <p:cNvSpPr/>
+              <p:nvPr/>
+            </p:nvSpPr>
+            <p:spPr>
+              <a:xfrm>
+                <a:off x="4316820" y="1722473"/>
+                <a:ext cx="191385" cy="2583712"/>
+              </a:xfrm>
+              <a:prstGeom prst="leftBrace">
+                <a:avLst/>
+              </a:prstGeom>
+            </p:spPr>
+            <p:style>
+              <a:lnRef idx="1">
+                <a:schemeClr val="dk1"/>
+              </a:lnRef>
+              <a:fillRef idx="0">
+                <a:schemeClr val="dk1"/>
+              </a:fillRef>
+              <a:effectRef idx="0">
+                <a:schemeClr val="dk1"/>
+              </a:effectRef>
+              <a:fontRef idx="minor">
+                <a:schemeClr val="tx1"/>
+              </a:fontRef>
+            </p:style>
+            <p:txBody>
+              <a:bodyPr rtlCol="0" anchor="ctr"/>
+              <a:lstStyle/>
+              <a:p>
+                <a:pPr algn="ctr"/>
+                <a:endParaRPr lang="pt-BR"/>
+              </a:p>
+            </p:txBody>
+          </p:sp>
+          <p:sp>
+            <p:nvSpPr>
+              <p:cNvPr id="12" name="Chave Esquerda 11">
+                <a:extLst>
+                  <a:ext uri="{FF2B5EF4-FFF2-40B4-BE49-F238E27FC236}">
+                    <a16:creationId xmlns:a16="http://schemas.microsoft.com/office/drawing/2014/main" id="{810771B5-9EB9-4539-B7A5-F46C4E692FA1}"/>
+                  </a:ext>
+                </a:extLst>
+              </p:cNvPr>
+              <p:cNvSpPr/>
+              <p:nvPr/>
+            </p:nvSpPr>
+            <p:spPr>
+              <a:xfrm rot="5400000">
+                <a:off x="5953342" y="116072"/>
+                <a:ext cx="225057" cy="2668773"/>
+              </a:xfrm>
+              <a:prstGeom prst="leftBrace">
+                <a:avLst/>
+              </a:prstGeom>
+            </p:spPr>
+            <p:style>
+              <a:lnRef idx="1">
+                <a:schemeClr val="dk1"/>
+              </a:lnRef>
+              <a:fillRef idx="0">
+                <a:schemeClr val="dk1"/>
+              </a:fillRef>
+              <a:effectRef idx="0">
+                <a:schemeClr val="dk1"/>
+              </a:effectRef>
+              <a:fontRef idx="minor">
+                <a:schemeClr val="tx1"/>
+              </a:fontRef>
+            </p:style>
+            <p:txBody>
+              <a:bodyPr rtlCol="0" anchor="ctr"/>
+              <a:lstStyle/>
+              <a:p>
+                <a:pPr algn="ctr"/>
+                <a:endParaRPr lang="pt-BR"/>
+              </a:p>
+            </p:txBody>
+          </p:sp>
+          <p:sp>
+            <p:nvSpPr>
+              <p:cNvPr id="13" name="CaixaDeTexto 12">
+                <a:extLst>
+                  <a:ext uri="{FF2B5EF4-FFF2-40B4-BE49-F238E27FC236}">
+                    <a16:creationId xmlns:a16="http://schemas.microsoft.com/office/drawing/2014/main" id="{3B3D9926-E19F-4FC6-86DB-A2F837338E31}"/>
+                  </a:ext>
+                </a:extLst>
+              </p:cNvPr>
+              <p:cNvSpPr txBox="1"/>
+              <p:nvPr/>
+            </p:nvSpPr>
+            <p:spPr>
+              <a:xfrm>
+                <a:off x="5159057" y="825877"/>
+                <a:ext cx="1815901" cy="3908762"/>
+              </a:xfrm>
+              <a:prstGeom prst="rect">
+                <a:avLst/>
+              </a:prstGeom>
+              <a:noFill/>
+            </p:spPr>
+            <p:txBody>
+              <a:bodyPr wrap="square" rtlCol="0">
+                <a:spAutoFit/>
+              </a:bodyPr>
+              <a:lstStyle/>
+              <a:p>
+                <a:pPr algn="ctr"/>
+                <a:r>
+                  <a:rPr lang="pt-BR" sz="2400" dirty="0"/>
+                  <a:t>L</a:t>
+                </a:r>
+                <a:r>
+                  <a:rPr lang="pt-BR" sz="2400" baseline="-25000" dirty="0"/>
+                  <a:t>x</a:t>
+                </a:r>
+              </a:p>
+              <a:p>
+                <a:endParaRPr lang="pt-BR" sz="2400" baseline="-25000" dirty="0"/>
+              </a:p>
+              <a:p>
+                <a:endParaRPr lang="pt-BR" sz="2400" baseline="-25000" dirty="0"/>
+              </a:p>
+              <a:p>
+                <a:pPr algn="ctr"/>
+                <a:r>
+                  <a:rPr lang="pt-BR" sz="2400" dirty="0"/>
+                  <a:t>T</a:t>
+                </a:r>
+                <a:r>
+                  <a:rPr lang="pt-BR" sz="2400" baseline="-25000" dirty="0"/>
+                  <a:t>2</a:t>
+                </a:r>
+                <a:r>
+                  <a:rPr lang="pt-BR" sz="2400" dirty="0"/>
+                  <a:t> = 10ºC</a:t>
+                </a:r>
+              </a:p>
+              <a:p>
+                <a:endParaRPr lang="pt-BR" sz="2400" dirty="0"/>
+              </a:p>
+              <a:p>
+                <a:endParaRPr lang="pt-BR" sz="2400" dirty="0"/>
+              </a:p>
+              <a:p>
+                <a:endParaRPr lang="pt-BR" sz="2400" dirty="0"/>
+              </a:p>
+              <a:p>
+                <a:endParaRPr lang="pt-BR" sz="2400" dirty="0"/>
+              </a:p>
+              <a:p>
+                <a:endParaRPr lang="pt-BR" sz="2400" dirty="0"/>
+              </a:p>
+              <a:p>
+                <a:pPr algn="ctr"/>
+                <a:r>
+                  <a:rPr lang="pt-BR" sz="2400" dirty="0"/>
+                  <a:t>T</a:t>
+                </a:r>
+                <a:r>
+                  <a:rPr lang="pt-BR" sz="2400" baseline="-25000" dirty="0"/>
+                  <a:t>1</a:t>
+                </a:r>
+                <a:r>
+                  <a:rPr lang="pt-BR" sz="2400" dirty="0"/>
+                  <a:t> = 100ºC</a:t>
+                </a:r>
+              </a:p>
+              <a:p>
+                <a:endParaRPr lang="pt-BR" sz="2400" dirty="0"/>
+              </a:p>
+            </p:txBody>
+          </p:sp>
+          <p:sp>
+            <p:nvSpPr>
+              <p:cNvPr id="14" name="CaixaDeTexto 13">
+                <a:extLst>
+                  <a:ext uri="{FF2B5EF4-FFF2-40B4-BE49-F238E27FC236}">
+                    <a16:creationId xmlns:a16="http://schemas.microsoft.com/office/drawing/2014/main" id="{B6FAEF12-2AB6-4D70-ACC6-D4EBA4D83984}"/>
+                  </a:ext>
+                </a:extLst>
+              </p:cNvPr>
+              <p:cNvSpPr txBox="1"/>
+              <p:nvPr/>
+            </p:nvSpPr>
+            <p:spPr>
+              <a:xfrm>
+                <a:off x="3834484" y="2714384"/>
+                <a:ext cx="3601627" cy="461665"/>
+              </a:xfrm>
+              <a:prstGeom prst="rect">
+                <a:avLst/>
+              </a:prstGeom>
+              <a:noFill/>
+            </p:spPr>
+            <p:txBody>
+              <a:bodyPr wrap="none" rtlCol="0">
+                <a:spAutoFit/>
+              </a:bodyPr>
+              <a:lstStyle/>
+              <a:p>
+                <a:r>
+                  <a:rPr lang="pt-BR" sz="2400" dirty="0"/>
+                  <a:t>L</a:t>
+                </a:r>
+                <a:r>
+                  <a:rPr lang="pt-BR" sz="2400" baseline="-25000" dirty="0"/>
+                  <a:t>y               </a:t>
+                </a:r>
+                <a:r>
+                  <a:rPr lang="pt-BR" sz="2400" dirty="0"/>
+                  <a:t>T</a:t>
+                </a:r>
+                <a:r>
+                  <a:rPr lang="pt-BR" sz="2400" baseline="-25000" dirty="0"/>
+                  <a:t>1                                           </a:t>
+                </a:r>
+                <a:r>
+                  <a:rPr lang="pt-BR" sz="2400" dirty="0"/>
+                  <a:t>T</a:t>
+                </a:r>
+                <a:r>
+                  <a:rPr lang="pt-BR" sz="2400" baseline="-25000" dirty="0"/>
+                  <a:t>1</a:t>
+                </a:r>
+              </a:p>
+            </p:txBody>
+          </p:sp>
+        </p:grpSp>
+      </p:grpSp>
+    </p:spTree>
+    <p:extLst>
+      <p:ext uri="{BB962C8B-B14F-4D97-AF65-F5344CB8AC3E}">
+        <p14:creationId xmlns:p14="http://schemas.microsoft.com/office/powerpoint/2010/main" val="3397957526"/>
+      </p:ext>
+    </p:extLst>
+  </p:cSld>
+  <p:clrMapOvr>
+    <a:masterClrMapping/>
+  </p:clrMapOvr>
+</p:sld>
+</file>
+
+<file path=ppt/slides/slide4.xml><?xml version="1.0" encoding="utf-8"?>
+<p:sld xmlns:a="http://schemas.openxmlformats.org/drawingml/2006/main" xmlns:r="http://schemas.openxmlformats.org/officeDocument/2006/relationships" xmlns:p="http://schemas.openxmlformats.org/presentationml/2006/main">
+  <p:cSld>
+    <p:spTree>
+      <p:nvGrpSpPr>
+        <p:cNvPr id="1" name=""/>
+        <p:cNvGrpSpPr/>
+        <p:nvPr/>
+      </p:nvGrpSpPr>
+      <p:grpSpPr>
+        <a:xfrm>
+          <a:off x="0" y="0"/>
+          <a:ext cx="0" cy="0"/>
+          <a:chOff x="0" y="0"/>
+          <a:chExt cx="0" cy="0"/>
+        </a:xfrm>
+      </p:grpSpPr>
+      <p:pic>
+        <p:nvPicPr>
+          <p:cNvPr id="5" name="Espaço Reservado para Conteúdo 4">
+            <a:extLst>
+              <a:ext uri="{FF2B5EF4-FFF2-40B4-BE49-F238E27FC236}">
+                <a16:creationId xmlns:a16="http://schemas.microsoft.com/office/drawing/2014/main" id="{99138F43-94D1-402C-842C-EB18B6D2ECCD}"/>
+              </a:ext>
+            </a:extLst>
+          </p:cNvPr>
+          <p:cNvPicPr>
+            <a:picLocks noGrp="1" noChangeAspect="1"/>
+          </p:cNvPicPr>
+          <p:nvPr>
+            <p:ph idx="1"/>
+          </p:nvPr>
+        </p:nvPicPr>
+        <p:blipFill>
+          <a:blip r:embed="rId2">
+            <a:extLst>
+              <a:ext uri="{28A0092B-C50C-407E-A947-70E740481C1C}">
+                <a14:useLocalDpi xmlns:a14="http://schemas.microsoft.com/office/drawing/2010/main" val="0"/>
+              </a:ext>
+            </a:extLst>
+          </a:blip>
+          <a:stretch>
+            <a:fillRect/>
+          </a:stretch>
+        </p:blipFill>
+        <p:spPr>
+          <a:xfrm>
+            <a:off x="1282014" y="1113244"/>
+            <a:ext cx="8883691" cy="4351338"/>
+          </a:xfrm>
+        </p:spPr>
+      </p:pic>
+      <p:pic>
+        <p:nvPicPr>
+          <p:cNvPr id="7" name="Imagem 6">
+            <a:extLst>
+              <a:ext uri="{FF2B5EF4-FFF2-40B4-BE49-F238E27FC236}">
+                <a16:creationId xmlns:a16="http://schemas.microsoft.com/office/drawing/2014/main" id="{C41FE4F9-1A70-4A8C-8BCF-D28EC33038DC}"/>
+              </a:ext>
+            </a:extLst>
+          </p:cNvPr>
+          <p:cNvPicPr>
+            <a:picLocks noChangeAspect="1"/>
+          </p:cNvPicPr>
+          <p:nvPr/>
+        </p:nvPicPr>
+        <p:blipFill>
+          <a:blip r:embed="rId3"/>
+          <a:stretch>
+            <a:fillRect/>
+          </a:stretch>
+        </p:blipFill>
+        <p:spPr>
+          <a:xfrm>
+            <a:off x="1522051" y="4224506"/>
+            <a:ext cx="1176282" cy="1176282"/>
+          </a:xfrm>
+          <a:prstGeom prst="rect">
+            <a:avLst/>
+          </a:prstGeom>
+        </p:spPr>
+      </p:pic>
+    </p:spTree>
+    <p:extLst>
+      <p:ext uri="{BB962C8B-B14F-4D97-AF65-F5344CB8AC3E}">
+        <p14:creationId xmlns:p14="http://schemas.microsoft.com/office/powerpoint/2010/main" val="3255266488"/>
+      </p:ext>
+    </p:extLst>
+  </p:cSld>
+  <p:clrMapOvr>
+    <a:masterClrMapping/>
+  </p:clrMapOvr>
+</p:sld>
+</file>
+
 <file path=ppt/theme/theme1.xml><?xml version="1.0" encoding="utf-8"?>
 <a:theme xmlns:a="http://schemas.openxmlformats.org/drawingml/2006/main" name="Tema do Office">
   <a:themeElements>

</xml_diff>